<commit_message>
Final fixes on diploma work
</commit_message>
<xml_diff>
--- a/diploma_work_materials/Diploma_slides.pptx
+++ b/diploma_work_materials/Diploma_slides.pptx
@@ -235,7 +235,7 @@
           <a:p>
             <a:fld id="{DC0B8FE5-3809-4277-AF2B-8784DBC000AA}" type="datetimeFigureOut">
               <a:rPr lang="en-US" smtClean="0"/>
-              <a:t>5/25/2018</a:t>
+              <a:t>5/29/2018</a:t>
             </a:fld>
             <a:endParaRPr lang="en-US"/>
           </a:p>
@@ -696,7 +696,7 @@
           <a:p>
             <a:fld id="{9616E58A-1502-49A9-81BD-C67CE2D6112C}" type="datetimeFigureOut">
               <a:rPr lang="en-US" smtClean="0"/>
-              <a:t>5/25/2018</a:t>
+              <a:t>5/29/2018</a:t>
             </a:fld>
             <a:endParaRPr lang="en-US"/>
           </a:p>
@@ -961,7 +961,7 @@
           <a:p>
             <a:fld id="{9616E58A-1502-49A9-81BD-C67CE2D6112C}" type="datetimeFigureOut">
               <a:rPr lang="en-US" smtClean="0"/>
-              <a:t>5/25/2018</a:t>
+              <a:t>5/29/2018</a:t>
             </a:fld>
             <a:endParaRPr lang="en-US"/>
           </a:p>
@@ -1136,7 +1136,7 @@
           <a:p>
             <a:fld id="{9616E58A-1502-49A9-81BD-C67CE2D6112C}" type="datetimeFigureOut">
               <a:rPr lang="en-US" smtClean="0"/>
-              <a:t>5/25/2018</a:t>
+              <a:t>5/29/2018</a:t>
             </a:fld>
             <a:endParaRPr lang="en-US"/>
           </a:p>
@@ -1301,7 +1301,7 @@
           <a:p>
             <a:fld id="{9616E58A-1502-49A9-81BD-C67CE2D6112C}" type="datetimeFigureOut">
               <a:rPr lang="en-US" smtClean="0"/>
-              <a:t>5/25/2018</a:t>
+              <a:t>5/29/2018</a:t>
             </a:fld>
             <a:endParaRPr lang="en-US"/>
           </a:p>
@@ -1550,7 +1550,7 @@
           <a:p>
             <a:fld id="{9616E58A-1502-49A9-81BD-C67CE2D6112C}" type="datetimeFigureOut">
               <a:rPr lang="en-US" smtClean="0"/>
-              <a:t>5/25/2018</a:t>
+              <a:t>5/29/2018</a:t>
             </a:fld>
             <a:endParaRPr lang="en-US"/>
           </a:p>
@@ -1833,7 +1833,7 @@
           <a:p>
             <a:fld id="{9616E58A-1502-49A9-81BD-C67CE2D6112C}" type="datetimeFigureOut">
               <a:rPr lang="en-US" smtClean="0"/>
-              <a:t>5/25/2018</a:t>
+              <a:t>5/29/2018</a:t>
             </a:fld>
             <a:endParaRPr lang="en-US"/>
           </a:p>
@@ -2272,7 +2272,7 @@
           <a:p>
             <a:fld id="{9616E58A-1502-49A9-81BD-C67CE2D6112C}" type="datetimeFigureOut">
               <a:rPr lang="en-US" smtClean="0"/>
-              <a:t>5/25/2018</a:t>
+              <a:t>5/29/2018</a:t>
             </a:fld>
             <a:endParaRPr lang="en-US"/>
           </a:p>
@@ -2385,7 +2385,7 @@
           <a:p>
             <a:fld id="{9616E58A-1502-49A9-81BD-C67CE2D6112C}" type="datetimeFigureOut">
               <a:rPr lang="en-US" smtClean="0"/>
-              <a:t>5/25/2018</a:t>
+              <a:t>5/29/2018</a:t>
             </a:fld>
             <a:endParaRPr lang="en-US"/>
           </a:p>
@@ -2475,7 +2475,7 @@
           <a:p>
             <a:fld id="{9616E58A-1502-49A9-81BD-C67CE2D6112C}" type="datetimeFigureOut">
               <a:rPr lang="en-US" smtClean="0"/>
-              <a:t>5/25/2018</a:t>
+              <a:t>5/29/2018</a:t>
             </a:fld>
             <a:endParaRPr lang="en-US"/>
           </a:p>
@@ -2717,7 +2717,7 @@
           <a:p>
             <a:fld id="{9616E58A-1502-49A9-81BD-C67CE2D6112C}" type="datetimeFigureOut">
               <a:rPr lang="en-US" smtClean="0"/>
-              <a:t>5/25/2018</a:t>
+              <a:t>5/29/2018</a:t>
             </a:fld>
             <a:endParaRPr lang="en-US"/>
           </a:p>
@@ -3011,7 +3011,7 @@
           <a:p>
             <a:fld id="{9616E58A-1502-49A9-81BD-C67CE2D6112C}" type="datetimeFigureOut">
               <a:rPr lang="en-US" smtClean="0"/>
-              <a:t>5/25/2018</a:t>
+              <a:t>5/29/2018</a:t>
             </a:fld>
             <a:endParaRPr lang="en-US"/>
           </a:p>
@@ -3305,7 +3305,7 @@
           <a:p>
             <a:fld id="{9616E58A-1502-49A9-81BD-C67CE2D6112C}" type="datetimeFigureOut">
               <a:rPr lang="en-US" smtClean="0"/>
-              <a:t>5/25/2018</a:t>
+              <a:t>5/29/2018</a:t>
             </a:fld>
             <a:endParaRPr lang="en-US"/>
           </a:p>
@@ -6936,6 +6936,42 @@
           </a:xfrm>
         </p:spPr>
       </p:pic>
+      <p:pic>
+        <p:nvPicPr>
+          <p:cNvPr id="4" name="Picture 3">
+            <a:extLst>
+              <a:ext uri="{FF2B5EF4-FFF2-40B4-BE49-F238E27FC236}">
+                <a16:creationId xmlns:a16="http://schemas.microsoft.com/office/drawing/2014/main" id="{9ADC9442-5270-4F42-9416-3508CC143B85}"/>
+              </a:ext>
+            </a:extLst>
+          </p:cNvPr>
+          <p:cNvPicPr>
+            <a:picLocks noChangeAspect="1"/>
+          </p:cNvPicPr>
+          <p:nvPr/>
+        </p:nvPicPr>
+        <p:blipFill>
+          <a:blip r:embed="rId3">
+            <a:extLst>
+              <a:ext uri="{28A0092B-C50C-407E-A947-70E740481C1C}">
+                <a14:useLocalDpi xmlns:a14="http://schemas.microsoft.com/office/drawing/2010/main" val="0"/>
+              </a:ext>
+            </a:extLst>
+          </a:blip>
+          <a:stretch>
+            <a:fillRect/>
+          </a:stretch>
+        </p:blipFill>
+        <p:spPr>
+          <a:xfrm>
+            <a:off x="457200" y="1785902"/>
+            <a:ext cx="7620000" cy="4306957"/>
+          </a:xfrm>
+          <a:prstGeom prst="rect">
+            <a:avLst/>
+          </a:prstGeom>
+        </p:spPr>
+      </p:pic>
     </p:spTree>
     <p:extLst>
       <p:ext uri="{BB962C8B-B14F-4D97-AF65-F5344CB8AC3E}">
@@ -7663,8 +7699,8 @@
           </a:p>
         </p:txBody>
       </p:sp>
-      <mc:AlternateContent xmlns:mc="http://schemas.openxmlformats.org/markup-compatibility/2006">
-        <mc:Choice xmlns:a14="http://schemas.microsoft.com/office/drawing/2010/main" Requires="a14">
+      <mc:AlternateContent xmlns:mc="http://schemas.openxmlformats.org/markup-compatibility/2006" xmlns:a14="http://schemas.microsoft.com/office/drawing/2010/main">
+        <mc:Choice Requires="a14">
           <p:sp>
             <p:nvSpPr>
               <p:cNvPr id="3" name="Объект 2"/>
@@ -7944,7 +7980,7 @@
             </p:txBody>
           </p:sp>
         </mc:Choice>
-        <mc:Fallback>
+        <mc:Fallback xmlns="">
           <p:sp>
             <p:nvSpPr>
               <p:cNvPr id="3" name="Объект 2"/>
@@ -8031,8 +8067,8 @@
           </a:p>
         </p:txBody>
       </p:sp>
-      <mc:AlternateContent xmlns:mc="http://schemas.openxmlformats.org/markup-compatibility/2006" xmlns:a14="http://schemas.microsoft.com/office/drawing/2010/main">
-        <mc:Choice Requires="a14">
+      <mc:AlternateContent xmlns:mc="http://schemas.openxmlformats.org/markup-compatibility/2006">
+        <mc:Choice xmlns:a14="http://schemas.microsoft.com/office/drawing/2010/main" Requires="a14">
           <p:sp>
             <p:nvSpPr>
               <p:cNvPr id="3" name="Объект 2"/>
@@ -8296,10 +8332,10 @@
                       </m:e>
                       <m:sub>
                         <m:r>
-                          <a:rPr lang="ru-RU" sz="2400" i="1">
-                            <a:latin typeface="Cambria Math"/>
+                          <a:rPr lang="en-US" sz="2400" b="1" i="1" smtClean="0">
+                            <a:latin typeface="Cambria Math" panose="02040503050406030204" pitchFamily="18" charset="0"/>
                           </a:rPr>
-                          <m:t>𝒋</m:t>
+                          <m:t>𝒊</m:t>
                         </m:r>
                       </m:sub>
                     </m:sSub>
@@ -8329,7 +8365,7 @@
             </p:txBody>
           </p:sp>
         </mc:Choice>
-        <mc:Fallback xmlns="">
+        <mc:Fallback>
           <p:sp>
             <p:nvSpPr>
               <p:cNvPr id="3" name="Объект 2"/>

</xml_diff>